<commit_message>
Docs die Rafa überschrieben hat wieder richtig gestellt
</commit_message>
<xml_diff>
--- a/documentation/presentation/Analyse/Analyse.pptx
+++ b/documentation/presentation/Analyse/Analyse.pptx
@@ -8,12 +8,14 @@
     <p:sldId id="256" r:id="rId2"/>
     <p:sldId id="257" r:id="rId3"/>
     <p:sldId id="260" r:id="rId4"/>
-    <p:sldId id="261" r:id="rId5"/>
+    <p:sldId id="265" r:id="rId5"/>
     <p:sldId id="263" r:id="rId6"/>
-    <p:sldId id="262" r:id="rId7"/>
-    <p:sldId id="264" r:id="rId8"/>
-    <p:sldId id="259" r:id="rId9"/>
-    <p:sldId id="258" r:id="rId10"/>
+    <p:sldId id="261" r:id="rId7"/>
+    <p:sldId id="262" r:id="rId8"/>
+    <p:sldId id="264" r:id="rId9"/>
+    <p:sldId id="266" r:id="rId10"/>
+    <p:sldId id="259" r:id="rId11"/>
+    <p:sldId id="258" r:id="rId12"/>
   </p:sldIdLst>
   <p:sldSz cx="9144000" cy="6858000" type="screen4x3"/>
   <p:notesSz cx="6858000" cy="9144000"/>
@@ -256,7 +258,7 @@
           <a:p>
             <a:fld id="{6A5DC9BA-3FDA-4498-91BC-F5637C6762DB}" type="datetimeFigureOut">
               <a:rPr lang="de-CH" smtClean="0"/>
-              <a:t>21.10.2012</a:t>
+              <a:t>22.10.2012</a:t>
             </a:fld>
             <a:endParaRPr lang="de-CH"/>
           </a:p>
@@ -1156,7 +1158,7 @@
           <a:p>
             <a:fld id="{6A5DC9BA-3FDA-4498-91BC-F5637C6762DB}" type="datetimeFigureOut">
               <a:rPr lang="de-CH" smtClean="0"/>
-              <a:t>21.10.2012</a:t>
+              <a:t>22.10.2012</a:t>
             </a:fld>
             <a:endParaRPr lang="de-CH"/>
           </a:p>
@@ -1362,7 +1364,7 @@
           <a:p>
             <a:fld id="{6A5DC9BA-3FDA-4498-91BC-F5637C6762DB}" type="datetimeFigureOut">
               <a:rPr lang="de-CH" smtClean="0"/>
-              <a:t>21.10.2012</a:t>
+              <a:t>22.10.2012</a:t>
             </a:fld>
             <a:endParaRPr lang="de-CH"/>
           </a:p>
@@ -1563,7 +1565,7 @@
           <a:p>
             <a:fld id="{6A5DC9BA-3FDA-4498-91BC-F5637C6762DB}" type="datetimeFigureOut">
               <a:rPr lang="de-CH" smtClean="0"/>
-              <a:t>21.10.2012</a:t>
+              <a:t>22.10.2012</a:t>
             </a:fld>
             <a:endParaRPr lang="de-CH"/>
           </a:p>
@@ -1777,7 +1779,7 @@
           <a:p>
             <a:fld id="{6A5DC9BA-3FDA-4498-91BC-F5637C6762DB}" type="datetimeFigureOut">
               <a:rPr lang="de-CH" smtClean="0"/>
-              <a:t>21.10.2012</a:t>
+              <a:t>22.10.2012</a:t>
             </a:fld>
             <a:endParaRPr lang="de-CH"/>
           </a:p>
@@ -2591,7 +2593,7 @@
           <a:p>
             <a:fld id="{6A5DC9BA-3FDA-4498-91BC-F5637C6762DB}" type="datetimeFigureOut">
               <a:rPr lang="de-CH" smtClean="0"/>
-              <a:t>21.10.2012</a:t>
+              <a:t>22.10.2012</a:t>
             </a:fld>
             <a:endParaRPr lang="de-CH"/>
           </a:p>
@@ -2893,7 +2895,7 @@
           <a:p>
             <a:fld id="{6A5DC9BA-3FDA-4498-91BC-F5637C6762DB}" type="datetimeFigureOut">
               <a:rPr lang="de-CH" smtClean="0"/>
-              <a:t>21.10.2012</a:t>
+              <a:t>22.10.2012</a:t>
             </a:fld>
             <a:endParaRPr lang="de-CH"/>
           </a:p>
@@ -3268,7 +3270,7 @@
           <a:p>
             <a:fld id="{6A5DC9BA-3FDA-4498-91BC-F5637C6762DB}" type="datetimeFigureOut">
               <a:rPr lang="de-CH" smtClean="0"/>
-              <a:t>21.10.2012</a:t>
+              <a:t>22.10.2012</a:t>
             </a:fld>
             <a:endParaRPr lang="de-CH"/>
           </a:p>
@@ -3358,7 +3360,7 @@
           <a:p>
             <a:fld id="{6A5DC9BA-3FDA-4498-91BC-F5637C6762DB}" type="datetimeFigureOut">
               <a:rPr lang="de-CH" smtClean="0"/>
-              <a:t>21.10.2012</a:t>
+              <a:t>22.10.2012</a:t>
             </a:fld>
             <a:endParaRPr lang="de-CH"/>
           </a:p>
@@ -3906,7 +3908,7 @@
           <a:p>
             <a:fld id="{6A5DC9BA-3FDA-4498-91BC-F5637C6762DB}" type="datetimeFigureOut">
               <a:rPr lang="de-CH" smtClean="0"/>
-              <a:t>21.10.2012</a:t>
+              <a:t>22.10.2012</a:t>
             </a:fld>
             <a:endParaRPr lang="de-CH"/>
           </a:p>
@@ -4420,7 +4422,7 @@
           <a:p>
             <a:fld id="{6A5DC9BA-3FDA-4498-91BC-F5637C6762DB}" type="datetimeFigureOut">
               <a:rPr lang="de-CH" smtClean="0"/>
-              <a:t>21.10.2012</a:t>
+              <a:t>22.10.2012</a:t>
             </a:fld>
             <a:endParaRPr lang="de-CH"/>
           </a:p>
@@ -4665,7 +4667,7 @@
           <a:p>
             <a:fld id="{6A5DC9BA-3FDA-4498-91BC-F5637C6762DB}" type="datetimeFigureOut">
               <a:rPr lang="de-CH" smtClean="0"/>
-              <a:t>21.10.2012</a:t>
+              <a:t>22.10.2012</a:t>
             </a:fld>
             <a:endParaRPr lang="de-CH"/>
           </a:p>
@@ -5328,528 +5330,7 @@
 </p:sld>
 </file>
 
-<file path=ppt/slides/slide2.xml><?xml version="1.0" encoding="utf-8"?>
-<p:sld xmlns:a="http://schemas.openxmlformats.org/drawingml/2006/main" xmlns:r="http://schemas.openxmlformats.org/officeDocument/2006/relationships" xmlns:p="http://schemas.openxmlformats.org/presentationml/2006/main">
-  <p:cSld>
-    <p:spTree>
-      <p:nvGrpSpPr>
-        <p:cNvPr id="1" name=""/>
-        <p:cNvGrpSpPr/>
-        <p:nvPr/>
-      </p:nvGrpSpPr>
-      <p:grpSpPr>
-        <a:xfrm>
-          <a:off x="0" y="0"/>
-          <a:ext cx="0" cy="0"/>
-          <a:chOff x="0" y="0"/>
-          <a:chExt cx="0" cy="0"/>
-        </a:xfrm>
-      </p:grpSpPr>
-      <p:sp>
-        <p:nvSpPr>
-          <p:cNvPr id="2" name="Titel 1"/>
-          <p:cNvSpPr>
-            <a:spLocks noGrp="1"/>
-          </p:cNvSpPr>
-          <p:nvPr>
-            <p:ph type="title"/>
-          </p:nvPr>
-        </p:nvSpPr>
-        <p:spPr/>
-        <p:txBody>
-          <a:bodyPr/>
-          <a:lstStyle/>
-          <a:p>
-            <a:r>
-              <a:rPr lang="de-CH" dirty="0" smtClean="0"/>
-              <a:t>Agenda</a:t>
-            </a:r>
-            <a:endParaRPr lang="de-CH" dirty="0"/>
-          </a:p>
-        </p:txBody>
-      </p:sp>
-      <p:sp>
-        <p:nvSpPr>
-          <p:cNvPr id="3" name="Inhaltsplatzhalter 2"/>
-          <p:cNvSpPr>
-            <a:spLocks noGrp="1"/>
-          </p:cNvSpPr>
-          <p:nvPr>
-            <p:ph sz="quarter" idx="1"/>
-          </p:nvPr>
-        </p:nvSpPr>
-        <p:spPr/>
-        <p:txBody>
-          <a:bodyPr>
-            <a:normAutofit/>
-          </a:bodyPr>
-          <a:lstStyle/>
-          <a:p>
-            <a:r>
-              <a:rPr lang="de-CH" dirty="0"/>
-              <a:t>Stand Projekt </a:t>
-            </a:r>
-          </a:p>
-          <a:p>
-            <a:r>
-              <a:rPr lang="de-CH" dirty="0"/>
-              <a:t>Konkretere </a:t>
-            </a:r>
-            <a:r>
-              <a:rPr lang="de-CH" dirty="0" smtClean="0"/>
-              <a:t>Idee</a:t>
-            </a:r>
-          </a:p>
-          <a:p>
-            <a:r>
-              <a:rPr lang="de-CH" dirty="0"/>
-              <a:t>Domänen-Modell</a:t>
-            </a:r>
-          </a:p>
-          <a:p>
-            <a:r>
-              <a:rPr lang="de-CH" dirty="0" smtClean="0"/>
-              <a:t>Spezielle </a:t>
-            </a:r>
-            <a:r>
-              <a:rPr lang="de-CH" dirty="0" err="1"/>
-              <a:t>Use</a:t>
-            </a:r>
-            <a:r>
-              <a:rPr lang="de-CH" dirty="0"/>
-              <a:t> Cases</a:t>
-            </a:r>
-          </a:p>
-          <a:p>
-            <a:r>
-              <a:rPr lang="de-CH" dirty="0" smtClean="0"/>
-              <a:t>Technisches</a:t>
-            </a:r>
-            <a:endParaRPr lang="de-CH" dirty="0"/>
-          </a:p>
-          <a:p>
-            <a:r>
-              <a:rPr lang="de-CH" dirty="0"/>
-              <a:t>Prototyp</a:t>
-            </a:r>
-          </a:p>
-          <a:p>
-            <a:r>
-              <a:rPr lang="de-CH" dirty="0"/>
-              <a:t>Fragen</a:t>
-            </a:r>
-          </a:p>
-        </p:txBody>
-      </p:sp>
-    </p:spTree>
-    <p:extLst>
-      <p:ext uri="{BB962C8B-B14F-4D97-AF65-F5344CB8AC3E}">
-        <p14:creationId xmlns:p14="http://schemas.microsoft.com/office/powerpoint/2010/main" val="3438924387"/>
-      </p:ext>
-    </p:extLst>
-  </p:cSld>
-  <p:clrMapOvr>
-    <a:masterClrMapping/>
-  </p:clrMapOvr>
-</p:sld>
-</file>
-
-<file path=ppt/slides/slide3.xml><?xml version="1.0" encoding="utf-8"?>
-<p:sld xmlns:a="http://schemas.openxmlformats.org/drawingml/2006/main" xmlns:r="http://schemas.openxmlformats.org/officeDocument/2006/relationships" xmlns:p="http://schemas.openxmlformats.org/presentationml/2006/main">
-  <p:cSld>
-    <p:spTree>
-      <p:nvGrpSpPr>
-        <p:cNvPr id="1" name=""/>
-        <p:cNvGrpSpPr/>
-        <p:nvPr/>
-      </p:nvGrpSpPr>
-      <p:grpSpPr>
-        <a:xfrm>
-          <a:off x="0" y="0"/>
-          <a:ext cx="0" cy="0"/>
-          <a:chOff x="0" y="0"/>
-          <a:chExt cx="0" cy="0"/>
-        </a:xfrm>
-      </p:grpSpPr>
-      <p:sp>
-        <p:nvSpPr>
-          <p:cNvPr id="2" name="Titel 1"/>
-          <p:cNvSpPr>
-            <a:spLocks noGrp="1"/>
-          </p:cNvSpPr>
-          <p:nvPr>
-            <p:ph type="title"/>
-          </p:nvPr>
-        </p:nvSpPr>
-        <p:spPr/>
-        <p:txBody>
-          <a:bodyPr/>
-          <a:lstStyle/>
-          <a:p>
-            <a:r>
-              <a:rPr lang="de-CH" dirty="0" err="1" smtClean="0"/>
-              <a:t>Momentander</a:t>
-            </a:r>
-            <a:r>
-              <a:rPr lang="de-CH" dirty="0" smtClean="0"/>
-              <a:t> Stand</a:t>
-            </a:r>
-            <a:endParaRPr lang="de-CH" dirty="0"/>
-          </a:p>
-        </p:txBody>
-      </p:sp>
-      <p:sp>
-        <p:nvSpPr>
-          <p:cNvPr id="3" name="Inhaltsplatzhalter 2"/>
-          <p:cNvSpPr>
-            <a:spLocks noGrp="1"/>
-          </p:cNvSpPr>
-          <p:nvPr>
-            <p:ph sz="quarter" idx="1"/>
-          </p:nvPr>
-        </p:nvSpPr>
-        <p:spPr/>
-        <p:txBody>
-          <a:bodyPr/>
-          <a:lstStyle/>
-          <a:p>
-            <a:r>
-              <a:rPr lang="de-CH" dirty="0" err="1" smtClean="0"/>
-              <a:t>Todo</a:t>
-            </a:r>
-            <a:endParaRPr lang="de-CH" dirty="0" smtClean="0"/>
-          </a:p>
-          <a:p>
-            <a:endParaRPr lang="de-CH" dirty="0"/>
-          </a:p>
-        </p:txBody>
-      </p:sp>
-    </p:spTree>
-    <p:extLst>
-      <p:ext uri="{BB962C8B-B14F-4D97-AF65-F5344CB8AC3E}">
-        <p14:creationId xmlns:p14="http://schemas.microsoft.com/office/powerpoint/2010/main" val="2237911985"/>
-      </p:ext>
-    </p:extLst>
-  </p:cSld>
-  <p:clrMapOvr>
-    <a:masterClrMapping/>
-  </p:clrMapOvr>
-</p:sld>
-</file>
-
-<file path=ppt/slides/slide4.xml><?xml version="1.0" encoding="utf-8"?>
-<p:sld xmlns:a="http://schemas.openxmlformats.org/drawingml/2006/main" xmlns:r="http://schemas.openxmlformats.org/officeDocument/2006/relationships" xmlns:p="http://schemas.openxmlformats.org/presentationml/2006/main">
-  <p:cSld>
-    <p:spTree>
-      <p:nvGrpSpPr>
-        <p:cNvPr id="1" name=""/>
-        <p:cNvGrpSpPr/>
-        <p:nvPr/>
-      </p:nvGrpSpPr>
-      <p:grpSpPr>
-        <a:xfrm>
-          <a:off x="0" y="0"/>
-          <a:ext cx="0" cy="0"/>
-          <a:chOff x="0" y="0"/>
-          <a:chExt cx="0" cy="0"/>
-        </a:xfrm>
-      </p:grpSpPr>
-      <p:sp>
-        <p:nvSpPr>
-          <p:cNvPr id="2" name="Titel 1"/>
-          <p:cNvSpPr>
-            <a:spLocks noGrp="1"/>
-          </p:cNvSpPr>
-          <p:nvPr>
-            <p:ph type="title"/>
-          </p:nvPr>
-        </p:nvSpPr>
-        <p:spPr/>
-        <p:txBody>
-          <a:bodyPr/>
-          <a:lstStyle/>
-          <a:p>
-            <a:r>
-              <a:rPr lang="de-CH" dirty="0" smtClean="0"/>
-              <a:t>Konkretere Ideen</a:t>
-            </a:r>
-            <a:endParaRPr lang="de-CH" dirty="0"/>
-          </a:p>
-        </p:txBody>
-      </p:sp>
-      <p:sp>
-        <p:nvSpPr>
-          <p:cNvPr id="3" name="Inhaltsplatzhalter 2"/>
-          <p:cNvSpPr>
-            <a:spLocks noGrp="1"/>
-          </p:cNvSpPr>
-          <p:nvPr>
-            <p:ph sz="quarter" idx="1"/>
-          </p:nvPr>
-        </p:nvSpPr>
-        <p:spPr/>
-        <p:txBody>
-          <a:bodyPr/>
-          <a:lstStyle/>
-          <a:p>
-            <a:r>
-              <a:rPr lang="de-CH" dirty="0" err="1" smtClean="0"/>
-              <a:t>Todo</a:t>
-            </a:r>
-            <a:endParaRPr lang="de-CH" dirty="0"/>
-          </a:p>
-        </p:txBody>
-      </p:sp>
-    </p:spTree>
-    <p:extLst>
-      <p:ext uri="{BB962C8B-B14F-4D97-AF65-F5344CB8AC3E}">
-        <p14:creationId xmlns:p14="http://schemas.microsoft.com/office/powerpoint/2010/main" val="1253552773"/>
-      </p:ext>
-    </p:extLst>
-  </p:cSld>
-  <p:clrMapOvr>
-    <a:masterClrMapping/>
-  </p:clrMapOvr>
-</p:sld>
-</file>
-
-<file path=ppt/slides/slide5.xml><?xml version="1.0" encoding="utf-8"?>
-<p:sld xmlns:a="http://schemas.openxmlformats.org/drawingml/2006/main" xmlns:r="http://schemas.openxmlformats.org/officeDocument/2006/relationships" xmlns:p="http://schemas.openxmlformats.org/presentationml/2006/main">
-  <p:cSld>
-    <p:spTree>
-      <p:nvGrpSpPr>
-        <p:cNvPr id="1" name=""/>
-        <p:cNvGrpSpPr/>
-        <p:nvPr/>
-      </p:nvGrpSpPr>
-      <p:grpSpPr>
-        <a:xfrm>
-          <a:off x="0" y="0"/>
-          <a:ext cx="0" cy="0"/>
-          <a:chOff x="0" y="0"/>
-          <a:chExt cx="0" cy="0"/>
-        </a:xfrm>
-      </p:grpSpPr>
-      <p:sp>
-        <p:nvSpPr>
-          <p:cNvPr id="2" name="Titel 1"/>
-          <p:cNvSpPr>
-            <a:spLocks noGrp="1"/>
-          </p:cNvSpPr>
-          <p:nvPr>
-            <p:ph type="title"/>
-          </p:nvPr>
-        </p:nvSpPr>
-        <p:spPr/>
-        <p:txBody>
-          <a:bodyPr/>
-          <a:lstStyle/>
-          <a:p>
-            <a:r>
-              <a:rPr lang="de-CH" dirty="0" smtClean="0"/>
-              <a:t>Domänenmodell</a:t>
-            </a:r>
-            <a:endParaRPr lang="de-CH" dirty="0"/>
-          </a:p>
-        </p:txBody>
-      </p:sp>
-      <p:sp>
-        <p:nvSpPr>
-          <p:cNvPr id="3" name="Inhaltsplatzhalter 2"/>
-          <p:cNvSpPr>
-            <a:spLocks noGrp="1"/>
-          </p:cNvSpPr>
-          <p:nvPr>
-            <p:ph sz="quarter" idx="1"/>
-          </p:nvPr>
-        </p:nvSpPr>
-        <p:spPr/>
-        <p:txBody>
-          <a:bodyPr/>
-          <a:lstStyle/>
-          <a:p>
-            <a:r>
-              <a:rPr lang="de-CH" dirty="0" err="1" smtClean="0"/>
-              <a:t>Todo</a:t>
-            </a:r>
-            <a:endParaRPr lang="de-CH" dirty="0"/>
-          </a:p>
-        </p:txBody>
-      </p:sp>
-    </p:spTree>
-    <p:extLst>
-      <p:ext uri="{BB962C8B-B14F-4D97-AF65-F5344CB8AC3E}">
-        <p14:creationId xmlns:p14="http://schemas.microsoft.com/office/powerpoint/2010/main" val="2876740877"/>
-      </p:ext>
-    </p:extLst>
-  </p:cSld>
-  <p:clrMapOvr>
-    <a:masterClrMapping/>
-  </p:clrMapOvr>
-</p:sld>
-</file>
-
-<file path=ppt/slides/slide6.xml><?xml version="1.0" encoding="utf-8"?>
-<p:sld xmlns:a="http://schemas.openxmlformats.org/drawingml/2006/main" xmlns:r="http://schemas.openxmlformats.org/officeDocument/2006/relationships" xmlns:p="http://schemas.openxmlformats.org/presentationml/2006/main">
-  <p:cSld>
-    <p:spTree>
-      <p:nvGrpSpPr>
-        <p:cNvPr id="1" name=""/>
-        <p:cNvGrpSpPr/>
-        <p:nvPr/>
-      </p:nvGrpSpPr>
-      <p:grpSpPr>
-        <a:xfrm>
-          <a:off x="0" y="0"/>
-          <a:ext cx="0" cy="0"/>
-          <a:chOff x="0" y="0"/>
-          <a:chExt cx="0" cy="0"/>
-        </a:xfrm>
-      </p:grpSpPr>
-      <p:sp>
-        <p:nvSpPr>
-          <p:cNvPr id="2" name="Titel 1"/>
-          <p:cNvSpPr>
-            <a:spLocks noGrp="1"/>
-          </p:cNvSpPr>
-          <p:nvPr>
-            <p:ph type="title"/>
-          </p:nvPr>
-        </p:nvSpPr>
-        <p:spPr/>
-        <p:txBody>
-          <a:bodyPr/>
-          <a:lstStyle/>
-          <a:p>
-            <a:r>
-              <a:rPr lang="de-CH" dirty="0" smtClean="0"/>
-              <a:t>Spezielle </a:t>
-            </a:r>
-            <a:r>
-              <a:rPr lang="de-CH" dirty="0" err="1" smtClean="0"/>
-              <a:t>Use</a:t>
-            </a:r>
-            <a:r>
-              <a:rPr lang="de-CH" dirty="0" smtClean="0"/>
-              <a:t> Cases</a:t>
-            </a:r>
-            <a:endParaRPr lang="de-CH" dirty="0"/>
-          </a:p>
-        </p:txBody>
-      </p:sp>
-      <p:sp>
-        <p:nvSpPr>
-          <p:cNvPr id="3" name="Inhaltsplatzhalter 2"/>
-          <p:cNvSpPr>
-            <a:spLocks noGrp="1"/>
-          </p:cNvSpPr>
-          <p:nvPr>
-            <p:ph sz="quarter" idx="1"/>
-          </p:nvPr>
-        </p:nvSpPr>
-        <p:spPr/>
-        <p:txBody>
-          <a:bodyPr/>
-          <a:lstStyle/>
-          <a:p>
-            <a:r>
-              <a:rPr lang="de-CH" dirty="0" err="1" smtClean="0"/>
-              <a:t>Todo</a:t>
-            </a:r>
-            <a:endParaRPr lang="de-CH" dirty="0"/>
-          </a:p>
-        </p:txBody>
-      </p:sp>
-    </p:spTree>
-    <p:extLst>
-      <p:ext uri="{BB962C8B-B14F-4D97-AF65-F5344CB8AC3E}">
-        <p14:creationId xmlns:p14="http://schemas.microsoft.com/office/powerpoint/2010/main" val="3664799231"/>
-      </p:ext>
-    </p:extLst>
-  </p:cSld>
-  <p:clrMapOvr>
-    <a:masterClrMapping/>
-  </p:clrMapOvr>
-</p:sld>
-</file>
-
-<file path=ppt/slides/slide7.xml><?xml version="1.0" encoding="utf-8"?>
-<p:sld xmlns:a="http://schemas.openxmlformats.org/drawingml/2006/main" xmlns:r="http://schemas.openxmlformats.org/officeDocument/2006/relationships" xmlns:p="http://schemas.openxmlformats.org/presentationml/2006/main">
-  <p:cSld>
-    <p:spTree>
-      <p:nvGrpSpPr>
-        <p:cNvPr id="1" name=""/>
-        <p:cNvGrpSpPr/>
-        <p:nvPr/>
-      </p:nvGrpSpPr>
-      <p:grpSpPr>
-        <a:xfrm>
-          <a:off x="0" y="0"/>
-          <a:ext cx="0" cy="0"/>
-          <a:chOff x="0" y="0"/>
-          <a:chExt cx="0" cy="0"/>
-        </a:xfrm>
-      </p:grpSpPr>
-      <p:sp>
-        <p:nvSpPr>
-          <p:cNvPr id="2" name="Titel 1"/>
-          <p:cNvSpPr>
-            <a:spLocks noGrp="1"/>
-          </p:cNvSpPr>
-          <p:nvPr>
-            <p:ph type="title"/>
-          </p:nvPr>
-        </p:nvSpPr>
-        <p:spPr/>
-        <p:txBody>
-          <a:bodyPr/>
-          <a:lstStyle/>
-          <a:p>
-            <a:r>
-              <a:rPr lang="de-CH" dirty="0" smtClean="0"/>
-              <a:t>Technisches</a:t>
-            </a:r>
-            <a:endParaRPr lang="de-CH" dirty="0"/>
-          </a:p>
-        </p:txBody>
-      </p:sp>
-      <p:sp>
-        <p:nvSpPr>
-          <p:cNvPr id="3" name="Inhaltsplatzhalter 2"/>
-          <p:cNvSpPr>
-            <a:spLocks noGrp="1"/>
-          </p:cNvSpPr>
-          <p:nvPr>
-            <p:ph sz="quarter" idx="1"/>
-          </p:nvPr>
-        </p:nvSpPr>
-        <p:spPr/>
-        <p:txBody>
-          <a:bodyPr/>
-          <a:lstStyle/>
-          <a:p>
-            <a:r>
-              <a:rPr lang="de-CH" dirty="0" err="1" smtClean="0"/>
-              <a:t>Todo</a:t>
-            </a:r>
-            <a:endParaRPr lang="de-CH" dirty="0"/>
-          </a:p>
-        </p:txBody>
-      </p:sp>
-    </p:spTree>
-    <p:extLst>
-      <p:ext uri="{BB962C8B-B14F-4D97-AF65-F5344CB8AC3E}">
-        <p14:creationId xmlns:p14="http://schemas.microsoft.com/office/powerpoint/2010/main" val="3480487774"/>
-      </p:ext>
-    </p:extLst>
-  </p:cSld>
-  <p:clrMapOvr>
-    <a:masterClrMapping/>
-  </p:clrMapOvr>
-</p:sld>
-</file>
-
-<file path=ppt/slides/slide8.xml><?xml version="1.0" encoding="utf-8"?>
+<file path=ppt/slides/slide10.xml><?xml version="1.0" encoding="utf-8"?>
 <p:sld xmlns:a="http://schemas.openxmlformats.org/drawingml/2006/main" xmlns:r="http://schemas.openxmlformats.org/officeDocument/2006/relationships" xmlns:p="http://schemas.openxmlformats.org/presentationml/2006/main">
   <p:cSld>
     <p:spTree>
@@ -5966,6 +5447,848 @@
 </p:sld>
 </file>
 
+<file path=ppt/slides/slide11.xml><?xml version="1.0" encoding="utf-8"?>
+<p:sld xmlns:a="http://schemas.openxmlformats.org/drawingml/2006/main" xmlns:r="http://schemas.openxmlformats.org/officeDocument/2006/relationships" xmlns:p="http://schemas.openxmlformats.org/presentationml/2006/main">
+  <p:cSld>
+    <p:spTree>
+      <p:nvGrpSpPr>
+        <p:cNvPr id="1" name=""/>
+        <p:cNvGrpSpPr/>
+        <p:nvPr/>
+      </p:nvGrpSpPr>
+      <p:grpSpPr>
+        <a:xfrm>
+          <a:off x="0" y="0"/>
+          <a:ext cx="0" cy="0"/>
+          <a:chOff x="0" y="0"/>
+          <a:chExt cx="0" cy="0"/>
+        </a:xfrm>
+      </p:grpSpPr>
+      <p:sp>
+        <p:nvSpPr>
+          <p:cNvPr id="11" name="Titel 10"/>
+          <p:cNvSpPr>
+            <a:spLocks noGrp="1"/>
+          </p:cNvSpPr>
+          <p:nvPr>
+            <p:ph type="ctrTitle"/>
+          </p:nvPr>
+        </p:nvSpPr>
+        <p:spPr/>
+        <p:txBody>
+          <a:bodyPr/>
+          <a:lstStyle/>
+          <a:p>
+            <a:r>
+              <a:rPr lang="de-CH" dirty="0" smtClean="0"/>
+              <a:t>Vielen Dank</a:t>
+            </a:r>
+            <a:endParaRPr lang="de-CH" dirty="0"/>
+          </a:p>
+        </p:txBody>
+      </p:sp>
+      <p:sp>
+        <p:nvSpPr>
+          <p:cNvPr id="12" name="Untertitel 11"/>
+          <p:cNvSpPr>
+            <a:spLocks noGrp="1"/>
+          </p:cNvSpPr>
+          <p:nvPr>
+            <p:ph type="subTitle" idx="1"/>
+          </p:nvPr>
+        </p:nvSpPr>
+        <p:spPr/>
+        <p:txBody>
+          <a:bodyPr/>
+          <a:lstStyle/>
+          <a:p>
+            <a:r>
+              <a:rPr lang="de-CH" dirty="0" smtClean="0"/>
+              <a:t>Für die Aufmerksamkeit</a:t>
+            </a:r>
+            <a:endParaRPr lang="de-CH" dirty="0"/>
+          </a:p>
+        </p:txBody>
+      </p:sp>
+    </p:spTree>
+    <p:extLst>
+      <p:ext uri="{BB962C8B-B14F-4D97-AF65-F5344CB8AC3E}">
+        <p14:creationId xmlns:p14="http://schemas.microsoft.com/office/powerpoint/2010/main" val="682285084"/>
+      </p:ext>
+    </p:extLst>
+  </p:cSld>
+  <p:clrMapOvr>
+    <a:masterClrMapping/>
+  </p:clrMapOvr>
+</p:sld>
+</file>
+
+<file path=ppt/slides/slide2.xml><?xml version="1.0" encoding="utf-8"?>
+<p:sld xmlns:a="http://schemas.openxmlformats.org/drawingml/2006/main" xmlns:r="http://schemas.openxmlformats.org/officeDocument/2006/relationships" xmlns:p="http://schemas.openxmlformats.org/presentationml/2006/main">
+  <p:cSld>
+    <p:spTree>
+      <p:nvGrpSpPr>
+        <p:cNvPr id="1" name=""/>
+        <p:cNvGrpSpPr/>
+        <p:nvPr/>
+      </p:nvGrpSpPr>
+      <p:grpSpPr>
+        <a:xfrm>
+          <a:off x="0" y="0"/>
+          <a:ext cx="0" cy="0"/>
+          <a:chOff x="0" y="0"/>
+          <a:chExt cx="0" cy="0"/>
+        </a:xfrm>
+      </p:grpSpPr>
+      <p:sp>
+        <p:nvSpPr>
+          <p:cNvPr id="2" name="Titel 1"/>
+          <p:cNvSpPr>
+            <a:spLocks noGrp="1"/>
+          </p:cNvSpPr>
+          <p:nvPr>
+            <p:ph type="title"/>
+          </p:nvPr>
+        </p:nvSpPr>
+        <p:spPr/>
+        <p:txBody>
+          <a:bodyPr/>
+          <a:lstStyle/>
+          <a:p>
+            <a:r>
+              <a:rPr lang="de-CH" dirty="0" smtClean="0"/>
+              <a:t>Agenda</a:t>
+            </a:r>
+            <a:endParaRPr lang="de-CH" dirty="0"/>
+          </a:p>
+        </p:txBody>
+      </p:sp>
+      <p:sp>
+        <p:nvSpPr>
+          <p:cNvPr id="3" name="Inhaltsplatzhalter 2"/>
+          <p:cNvSpPr>
+            <a:spLocks noGrp="1"/>
+          </p:cNvSpPr>
+          <p:nvPr>
+            <p:ph sz="quarter" idx="1"/>
+          </p:nvPr>
+        </p:nvSpPr>
+        <p:spPr/>
+        <p:txBody>
+          <a:bodyPr>
+            <a:normAutofit/>
+          </a:bodyPr>
+          <a:lstStyle/>
+          <a:p>
+            <a:r>
+              <a:rPr lang="de-CH" dirty="0"/>
+              <a:t>Stand </a:t>
+            </a:r>
+            <a:r>
+              <a:rPr lang="de-CH" dirty="0" smtClean="0"/>
+              <a:t>Projekt</a:t>
+            </a:r>
+          </a:p>
+          <a:p>
+            <a:r>
+              <a:rPr lang="de-CH" dirty="0" smtClean="0"/>
+              <a:t>Stand </a:t>
+            </a:r>
+            <a:r>
+              <a:rPr lang="de-CH" dirty="0" smtClean="0"/>
+              <a:t>Implementation</a:t>
+            </a:r>
+          </a:p>
+          <a:p>
+            <a:r>
+              <a:rPr lang="de-CH" dirty="0" smtClean="0"/>
+              <a:t>Domänen-Modell</a:t>
+            </a:r>
+            <a:endParaRPr lang="de-CH" dirty="0"/>
+          </a:p>
+          <a:p>
+            <a:r>
+              <a:rPr lang="de-CH" dirty="0" smtClean="0"/>
+              <a:t>Konkretere / Neue Ideen</a:t>
+            </a:r>
+            <a:endParaRPr lang="de-CH" dirty="0" smtClean="0"/>
+          </a:p>
+          <a:p>
+            <a:r>
+              <a:rPr lang="de-CH" dirty="0" smtClean="0"/>
+              <a:t>Spezielle </a:t>
+            </a:r>
+            <a:r>
+              <a:rPr lang="de-CH" dirty="0" err="1"/>
+              <a:t>Use</a:t>
+            </a:r>
+            <a:r>
+              <a:rPr lang="de-CH" dirty="0"/>
+              <a:t> Cases</a:t>
+            </a:r>
+          </a:p>
+          <a:p>
+            <a:r>
+              <a:rPr lang="de-CH" dirty="0" smtClean="0"/>
+              <a:t>Technisches</a:t>
+            </a:r>
+            <a:endParaRPr lang="de-CH" dirty="0"/>
+          </a:p>
+          <a:p>
+            <a:r>
+              <a:rPr lang="de-CH" dirty="0" smtClean="0"/>
+              <a:t>Demo Prototyp</a:t>
+            </a:r>
+            <a:endParaRPr lang="de-CH" dirty="0"/>
+          </a:p>
+          <a:p>
+            <a:r>
+              <a:rPr lang="de-CH" dirty="0"/>
+              <a:t>Fragen</a:t>
+            </a:r>
+          </a:p>
+        </p:txBody>
+      </p:sp>
+    </p:spTree>
+    <p:extLst>
+      <p:ext uri="{BB962C8B-B14F-4D97-AF65-F5344CB8AC3E}">
+        <p14:creationId xmlns:p14="http://schemas.microsoft.com/office/powerpoint/2010/main" val="3438924387"/>
+      </p:ext>
+    </p:extLst>
+  </p:cSld>
+  <p:clrMapOvr>
+    <a:masterClrMapping/>
+  </p:clrMapOvr>
+</p:sld>
+</file>
+
+<file path=ppt/slides/slide3.xml><?xml version="1.0" encoding="utf-8"?>
+<p:sld xmlns:a="http://schemas.openxmlformats.org/drawingml/2006/main" xmlns:r="http://schemas.openxmlformats.org/officeDocument/2006/relationships" xmlns:p="http://schemas.openxmlformats.org/presentationml/2006/main">
+  <p:cSld>
+    <p:spTree>
+      <p:nvGrpSpPr>
+        <p:cNvPr id="1" name=""/>
+        <p:cNvGrpSpPr/>
+        <p:nvPr/>
+      </p:nvGrpSpPr>
+      <p:grpSpPr>
+        <a:xfrm>
+          <a:off x="0" y="0"/>
+          <a:ext cx="0" cy="0"/>
+          <a:chOff x="0" y="0"/>
+          <a:chExt cx="0" cy="0"/>
+        </a:xfrm>
+      </p:grpSpPr>
+      <p:sp>
+        <p:nvSpPr>
+          <p:cNvPr id="2" name="Titel 1"/>
+          <p:cNvSpPr>
+            <a:spLocks noGrp="1"/>
+          </p:cNvSpPr>
+          <p:nvPr>
+            <p:ph type="title"/>
+          </p:nvPr>
+        </p:nvSpPr>
+        <p:spPr/>
+        <p:txBody>
+          <a:bodyPr/>
+          <a:lstStyle/>
+          <a:p>
+            <a:r>
+              <a:rPr lang="de-CH" dirty="0" smtClean="0"/>
+              <a:t>Stand Projekt</a:t>
+            </a:r>
+            <a:endParaRPr lang="de-CH" dirty="0"/>
+          </a:p>
+        </p:txBody>
+      </p:sp>
+      <p:sp>
+        <p:nvSpPr>
+          <p:cNvPr id="3" name="Inhaltsplatzhalter 2"/>
+          <p:cNvSpPr>
+            <a:spLocks noGrp="1"/>
+          </p:cNvSpPr>
+          <p:nvPr>
+            <p:ph sz="quarter" idx="1"/>
+          </p:nvPr>
+        </p:nvSpPr>
+        <p:spPr/>
+        <p:txBody>
+          <a:bodyPr/>
+          <a:lstStyle/>
+          <a:p>
+            <a:r>
+              <a:rPr lang="de-CH" dirty="0" err="1" smtClean="0"/>
+              <a:t>Todo</a:t>
+            </a:r>
+            <a:r>
+              <a:rPr lang="de-CH" dirty="0" smtClean="0"/>
+              <a:t> </a:t>
+            </a:r>
+            <a:r>
+              <a:rPr lang="de-CH" dirty="0" err="1" smtClean="0"/>
+              <a:t>Magelan</a:t>
+            </a:r>
+            <a:endParaRPr lang="de-CH" dirty="0" smtClean="0"/>
+          </a:p>
+          <a:p>
+            <a:endParaRPr lang="de-CH" dirty="0"/>
+          </a:p>
+        </p:txBody>
+      </p:sp>
+    </p:spTree>
+    <p:extLst>
+      <p:ext uri="{BB962C8B-B14F-4D97-AF65-F5344CB8AC3E}">
+        <p14:creationId xmlns:p14="http://schemas.microsoft.com/office/powerpoint/2010/main" val="2237911985"/>
+      </p:ext>
+    </p:extLst>
+  </p:cSld>
+  <p:clrMapOvr>
+    <a:masterClrMapping/>
+  </p:clrMapOvr>
+</p:sld>
+</file>
+
+<file path=ppt/slides/slide4.xml><?xml version="1.0" encoding="utf-8"?>
+<p:sld xmlns:a="http://schemas.openxmlformats.org/drawingml/2006/main" xmlns:r="http://schemas.openxmlformats.org/officeDocument/2006/relationships" xmlns:p="http://schemas.openxmlformats.org/presentationml/2006/main">
+  <p:cSld>
+    <p:spTree>
+      <p:nvGrpSpPr>
+        <p:cNvPr id="1" name=""/>
+        <p:cNvGrpSpPr/>
+        <p:nvPr/>
+      </p:nvGrpSpPr>
+      <p:grpSpPr>
+        <a:xfrm>
+          <a:off x="0" y="0"/>
+          <a:ext cx="0" cy="0"/>
+          <a:chOff x="0" y="0"/>
+          <a:chExt cx="0" cy="0"/>
+        </a:xfrm>
+      </p:grpSpPr>
+      <p:sp>
+        <p:nvSpPr>
+          <p:cNvPr id="2" name="Titel 1"/>
+          <p:cNvSpPr>
+            <a:spLocks noGrp="1"/>
+          </p:cNvSpPr>
+          <p:nvPr>
+            <p:ph type="title"/>
+          </p:nvPr>
+        </p:nvSpPr>
+        <p:spPr/>
+        <p:txBody>
+          <a:bodyPr/>
+          <a:lstStyle/>
+          <a:p>
+            <a:r>
+              <a:rPr lang="de-CH" dirty="0" smtClean="0"/>
+              <a:t>Stand Implementation</a:t>
+            </a:r>
+            <a:endParaRPr lang="de-CH" dirty="0"/>
+          </a:p>
+        </p:txBody>
+      </p:sp>
+      <p:sp>
+        <p:nvSpPr>
+          <p:cNvPr id="3" name="Inhaltsplatzhalter 2"/>
+          <p:cNvSpPr>
+            <a:spLocks noGrp="1"/>
+          </p:cNvSpPr>
+          <p:nvPr>
+            <p:ph sz="quarter" idx="1"/>
+          </p:nvPr>
+        </p:nvSpPr>
+        <p:spPr/>
+        <p:txBody>
+          <a:bodyPr/>
+          <a:lstStyle/>
+          <a:p>
+            <a:r>
+              <a:rPr lang="de-CH" sz="2300" dirty="0" err="1"/>
+              <a:t>LibGDX</a:t>
+            </a:r>
+            <a:endParaRPr lang="de-CH" sz="3100" dirty="0"/>
+          </a:p>
+          <a:p>
+            <a:pPr lvl="1"/>
+            <a:r>
+              <a:rPr lang="de-CH" sz="2000" dirty="0"/>
+              <a:t>Erste Tests positiv (Menu, Kollisionen, Performance)</a:t>
+            </a:r>
+            <a:endParaRPr lang="de-CH" dirty="0"/>
+          </a:p>
+          <a:p>
+            <a:r>
+              <a:rPr lang="de-CH" sz="2300" dirty="0" smtClean="0"/>
+              <a:t>Erster </a:t>
+            </a:r>
+            <a:r>
+              <a:rPr lang="de-CH" sz="2300" dirty="0"/>
+              <a:t>Prototyp</a:t>
+            </a:r>
+            <a:endParaRPr lang="de-CH" sz="3100" dirty="0"/>
+          </a:p>
+          <a:p>
+            <a:pPr lvl="1"/>
+            <a:r>
+              <a:rPr lang="de-CH" sz="2000" dirty="0"/>
+              <a:t>Hauptschiff steuerbar</a:t>
+            </a:r>
+            <a:endParaRPr lang="de-CH" dirty="0"/>
+          </a:p>
+          <a:p>
+            <a:pPr lvl="1"/>
+            <a:r>
+              <a:rPr lang="de-CH" sz="2000" dirty="0"/>
+              <a:t>Erster Gegner (Gruppe) vorhanden</a:t>
+            </a:r>
+            <a:endParaRPr lang="de-CH" dirty="0"/>
+          </a:p>
+          <a:p>
+            <a:endParaRPr lang="de-CH" dirty="0"/>
+          </a:p>
+        </p:txBody>
+      </p:sp>
+    </p:spTree>
+    <p:extLst>
+      <p:ext uri="{BB962C8B-B14F-4D97-AF65-F5344CB8AC3E}">
+        <p14:creationId xmlns:p14="http://schemas.microsoft.com/office/powerpoint/2010/main" val="1202080954"/>
+      </p:ext>
+    </p:extLst>
+  </p:cSld>
+  <p:clrMapOvr>
+    <a:masterClrMapping/>
+  </p:clrMapOvr>
+</p:sld>
+</file>
+
+<file path=ppt/slides/slide5.xml><?xml version="1.0" encoding="utf-8"?>
+<p:sld xmlns:a="http://schemas.openxmlformats.org/drawingml/2006/main" xmlns:r="http://schemas.openxmlformats.org/officeDocument/2006/relationships" xmlns:p="http://schemas.openxmlformats.org/presentationml/2006/main">
+  <p:cSld>
+    <p:spTree>
+      <p:nvGrpSpPr>
+        <p:cNvPr id="1" name=""/>
+        <p:cNvGrpSpPr/>
+        <p:nvPr/>
+      </p:nvGrpSpPr>
+      <p:grpSpPr>
+        <a:xfrm>
+          <a:off x="0" y="0"/>
+          <a:ext cx="0" cy="0"/>
+          <a:chOff x="0" y="0"/>
+          <a:chExt cx="0" cy="0"/>
+        </a:xfrm>
+      </p:grpSpPr>
+      <p:sp>
+        <p:nvSpPr>
+          <p:cNvPr id="2" name="Titel 1"/>
+          <p:cNvSpPr>
+            <a:spLocks noGrp="1"/>
+          </p:cNvSpPr>
+          <p:nvPr>
+            <p:ph type="title"/>
+          </p:nvPr>
+        </p:nvSpPr>
+        <p:spPr/>
+        <p:txBody>
+          <a:bodyPr/>
+          <a:lstStyle/>
+          <a:p>
+            <a:r>
+              <a:rPr lang="de-CH" dirty="0" smtClean="0"/>
+              <a:t>Domänenmodell</a:t>
+            </a:r>
+            <a:endParaRPr lang="de-CH" dirty="0"/>
+          </a:p>
+        </p:txBody>
+      </p:sp>
+      <p:pic>
+        <p:nvPicPr>
+          <p:cNvPr id="3" name="Picture 2"/>
+          <p:cNvPicPr>
+            <a:picLocks noChangeAspect="1" noChangeArrowheads="1"/>
+          </p:cNvPicPr>
+          <p:nvPr/>
+        </p:nvPicPr>
+        <p:blipFill>
+          <a:blip r:embed="rId2">
+            <a:extLst>
+              <a:ext uri="{28A0092B-C50C-407E-A947-70E740481C1C}">
+                <a14:useLocalDpi xmlns:a14="http://schemas.microsoft.com/office/drawing/2010/main" val="0"/>
+              </a:ext>
+            </a:extLst>
+          </a:blip>
+          <a:srcRect/>
+          <a:stretch>
+            <a:fillRect/>
+          </a:stretch>
+        </p:blipFill>
+        <p:spPr bwMode="auto">
+          <a:xfrm>
+            <a:off x="2148682" y="1766664"/>
+            <a:ext cx="4846637" cy="4038600"/>
+          </a:xfrm>
+          <a:prstGeom prst="rect">
+            <a:avLst/>
+          </a:prstGeom>
+          <a:noFill/>
+          <a:ln>
+            <a:noFill/>
+          </a:ln>
+          <a:effectLst/>
+          <a:extLst>
+            <a:ext uri="{909E8E84-426E-40DD-AFC4-6F175D3DCCD1}">
+              <a14:hiddenFill xmlns:a14="http://schemas.microsoft.com/office/drawing/2010/main">
+                <a:solidFill>
+                  <a:schemeClr val="accent1"/>
+                </a:solidFill>
+              </a14:hiddenFill>
+            </a:ext>
+            <a:ext uri="{91240B29-F687-4F45-9708-019B960494DF}">
+              <a14:hiddenLine xmlns:a14="http://schemas.microsoft.com/office/drawing/2010/main" w="9525">
+                <a:solidFill>
+                  <a:schemeClr val="tx1"/>
+                </a:solidFill>
+                <a:miter lim="800000"/>
+                <a:headEnd/>
+                <a:tailEnd/>
+              </a14:hiddenLine>
+            </a:ext>
+            <a:ext uri="{AF507438-7753-43E0-B8FC-AC1667EBCBE1}">
+              <a14:hiddenEffects xmlns:a14="http://schemas.microsoft.com/office/drawing/2010/main">
+                <a:effectLst>
+                  <a:outerShdw dist="35921" dir="2700000" algn="ctr" rotWithShape="0">
+                    <a:schemeClr val="bg2"/>
+                  </a:outerShdw>
+                </a:effectLst>
+              </a14:hiddenEffects>
+            </a:ext>
+          </a:extLst>
+        </p:spPr>
+      </p:pic>
+    </p:spTree>
+    <p:extLst>
+      <p:ext uri="{BB962C8B-B14F-4D97-AF65-F5344CB8AC3E}">
+        <p14:creationId xmlns:p14="http://schemas.microsoft.com/office/powerpoint/2010/main" val="2876740877"/>
+      </p:ext>
+    </p:extLst>
+  </p:cSld>
+  <p:clrMapOvr>
+    <a:masterClrMapping/>
+  </p:clrMapOvr>
+</p:sld>
+</file>
+
+<file path=ppt/slides/slide6.xml><?xml version="1.0" encoding="utf-8"?>
+<p:sld xmlns:a="http://schemas.openxmlformats.org/drawingml/2006/main" xmlns:r="http://schemas.openxmlformats.org/officeDocument/2006/relationships" xmlns:p="http://schemas.openxmlformats.org/presentationml/2006/main">
+  <p:cSld>
+    <p:spTree>
+      <p:nvGrpSpPr>
+        <p:cNvPr id="1" name=""/>
+        <p:cNvGrpSpPr/>
+        <p:nvPr/>
+      </p:nvGrpSpPr>
+      <p:grpSpPr>
+        <a:xfrm>
+          <a:off x="0" y="0"/>
+          <a:ext cx="0" cy="0"/>
+          <a:chOff x="0" y="0"/>
+          <a:chExt cx="0" cy="0"/>
+        </a:xfrm>
+      </p:grpSpPr>
+      <p:sp>
+        <p:nvSpPr>
+          <p:cNvPr id="2" name="Titel 1"/>
+          <p:cNvSpPr>
+            <a:spLocks noGrp="1"/>
+          </p:cNvSpPr>
+          <p:nvPr>
+            <p:ph type="title"/>
+          </p:nvPr>
+        </p:nvSpPr>
+        <p:spPr/>
+        <p:txBody>
+          <a:bodyPr/>
+          <a:lstStyle/>
+          <a:p>
+            <a:r>
+              <a:rPr lang="de-CH" dirty="0" smtClean="0"/>
+              <a:t>Konkretere / Neue Ideen</a:t>
+            </a:r>
+            <a:endParaRPr lang="de-CH" dirty="0"/>
+          </a:p>
+        </p:txBody>
+      </p:sp>
+      <p:sp>
+        <p:nvSpPr>
+          <p:cNvPr id="3" name="Inhaltsplatzhalter 2"/>
+          <p:cNvSpPr>
+            <a:spLocks noGrp="1"/>
+          </p:cNvSpPr>
+          <p:nvPr>
+            <p:ph sz="quarter" idx="1"/>
+          </p:nvPr>
+        </p:nvSpPr>
+        <p:spPr/>
+        <p:txBody>
+          <a:bodyPr/>
+          <a:lstStyle/>
+          <a:p>
+            <a:r>
+              <a:rPr lang="de-CH" sz="2300" dirty="0" smtClean="0"/>
+              <a:t>Detailliertere </a:t>
+            </a:r>
+            <a:r>
+              <a:rPr lang="de-CH" sz="2300" dirty="0" err="1" smtClean="0"/>
+              <a:t>Highscore</a:t>
+            </a:r>
+            <a:endParaRPr lang="de-CH" sz="3100" dirty="0"/>
+          </a:p>
+          <a:p>
+            <a:r>
+              <a:rPr lang="de-CH" sz="2300" dirty="0" smtClean="0"/>
+              <a:t>Gegnerbewegungsmuster</a:t>
+            </a:r>
+            <a:endParaRPr lang="de-CH" sz="3100" dirty="0"/>
+          </a:p>
+          <a:p>
+            <a:r>
+              <a:rPr lang="de-CH" sz="2300" dirty="0" smtClean="0"/>
+              <a:t>Gamefluss</a:t>
+            </a:r>
+            <a:endParaRPr lang="de-CH" sz="3100" dirty="0"/>
+          </a:p>
+        </p:txBody>
+      </p:sp>
+    </p:spTree>
+    <p:extLst>
+      <p:ext uri="{BB962C8B-B14F-4D97-AF65-F5344CB8AC3E}">
+        <p14:creationId xmlns:p14="http://schemas.microsoft.com/office/powerpoint/2010/main" val="1253552773"/>
+      </p:ext>
+    </p:extLst>
+  </p:cSld>
+  <p:clrMapOvr>
+    <a:masterClrMapping/>
+  </p:clrMapOvr>
+</p:sld>
+</file>
+
+<file path=ppt/slides/slide7.xml><?xml version="1.0" encoding="utf-8"?>
+<p:sld xmlns:a="http://schemas.openxmlformats.org/drawingml/2006/main" xmlns:r="http://schemas.openxmlformats.org/officeDocument/2006/relationships" xmlns:p="http://schemas.openxmlformats.org/presentationml/2006/main">
+  <p:cSld>
+    <p:spTree>
+      <p:nvGrpSpPr>
+        <p:cNvPr id="1" name=""/>
+        <p:cNvGrpSpPr/>
+        <p:nvPr/>
+      </p:nvGrpSpPr>
+      <p:grpSpPr>
+        <a:xfrm>
+          <a:off x="0" y="0"/>
+          <a:ext cx="0" cy="0"/>
+          <a:chOff x="0" y="0"/>
+          <a:chExt cx="0" cy="0"/>
+        </a:xfrm>
+      </p:grpSpPr>
+      <p:sp>
+        <p:nvSpPr>
+          <p:cNvPr id="2" name="Titel 1"/>
+          <p:cNvSpPr>
+            <a:spLocks noGrp="1"/>
+          </p:cNvSpPr>
+          <p:nvPr>
+            <p:ph type="title"/>
+          </p:nvPr>
+        </p:nvSpPr>
+        <p:spPr/>
+        <p:txBody>
+          <a:bodyPr/>
+          <a:lstStyle/>
+          <a:p>
+            <a:r>
+              <a:rPr lang="de-CH" dirty="0" smtClean="0"/>
+              <a:t>Spezielle </a:t>
+            </a:r>
+            <a:r>
+              <a:rPr lang="de-CH" dirty="0" err="1" smtClean="0"/>
+              <a:t>Use</a:t>
+            </a:r>
+            <a:r>
+              <a:rPr lang="de-CH" dirty="0" smtClean="0"/>
+              <a:t> Cases</a:t>
+            </a:r>
+            <a:endParaRPr lang="de-CH" dirty="0"/>
+          </a:p>
+        </p:txBody>
+      </p:sp>
+      <p:sp>
+        <p:nvSpPr>
+          <p:cNvPr id="3" name="Inhaltsplatzhalter 2"/>
+          <p:cNvSpPr>
+            <a:spLocks noGrp="1"/>
+          </p:cNvSpPr>
+          <p:nvPr>
+            <p:ph sz="quarter" idx="1"/>
+          </p:nvPr>
+        </p:nvSpPr>
+        <p:spPr/>
+        <p:txBody>
+          <a:bodyPr/>
+          <a:lstStyle/>
+          <a:p>
+            <a:r>
+              <a:rPr lang="de-CH" dirty="0" err="1" smtClean="0"/>
+              <a:t>Todo</a:t>
+            </a:r>
+            <a:endParaRPr lang="de-CH" dirty="0"/>
+          </a:p>
+        </p:txBody>
+      </p:sp>
+    </p:spTree>
+    <p:extLst>
+      <p:ext uri="{BB962C8B-B14F-4D97-AF65-F5344CB8AC3E}">
+        <p14:creationId xmlns:p14="http://schemas.microsoft.com/office/powerpoint/2010/main" val="3664799231"/>
+      </p:ext>
+    </p:extLst>
+  </p:cSld>
+  <p:clrMapOvr>
+    <a:masterClrMapping/>
+  </p:clrMapOvr>
+</p:sld>
+</file>
+
+<file path=ppt/slides/slide8.xml><?xml version="1.0" encoding="utf-8"?>
+<p:sld xmlns:a="http://schemas.openxmlformats.org/drawingml/2006/main" xmlns:r="http://schemas.openxmlformats.org/officeDocument/2006/relationships" xmlns:p="http://schemas.openxmlformats.org/presentationml/2006/main">
+  <p:cSld>
+    <p:spTree>
+      <p:nvGrpSpPr>
+        <p:cNvPr id="1" name=""/>
+        <p:cNvGrpSpPr/>
+        <p:nvPr/>
+      </p:nvGrpSpPr>
+      <p:grpSpPr>
+        <a:xfrm>
+          <a:off x="0" y="0"/>
+          <a:ext cx="0" cy="0"/>
+          <a:chOff x="0" y="0"/>
+          <a:chExt cx="0" cy="0"/>
+        </a:xfrm>
+      </p:grpSpPr>
+      <p:sp>
+        <p:nvSpPr>
+          <p:cNvPr id="2" name="Titel 1"/>
+          <p:cNvSpPr>
+            <a:spLocks noGrp="1"/>
+          </p:cNvSpPr>
+          <p:nvPr>
+            <p:ph type="title"/>
+          </p:nvPr>
+        </p:nvSpPr>
+        <p:spPr/>
+        <p:txBody>
+          <a:bodyPr/>
+          <a:lstStyle/>
+          <a:p>
+            <a:r>
+              <a:rPr lang="de-CH" dirty="0" smtClean="0"/>
+              <a:t>Technisches</a:t>
+            </a:r>
+            <a:endParaRPr lang="de-CH" dirty="0"/>
+          </a:p>
+        </p:txBody>
+      </p:sp>
+      <p:sp>
+        <p:nvSpPr>
+          <p:cNvPr id="3" name="Inhaltsplatzhalter 2"/>
+          <p:cNvSpPr>
+            <a:spLocks noGrp="1"/>
+          </p:cNvSpPr>
+          <p:nvPr>
+            <p:ph sz="quarter" idx="1"/>
+          </p:nvPr>
+        </p:nvSpPr>
+        <p:spPr/>
+        <p:txBody>
+          <a:bodyPr/>
+          <a:lstStyle/>
+          <a:p>
+            <a:r>
+              <a:rPr lang="de-CH" sz="2300" dirty="0" err="1"/>
+              <a:t>LibGdx</a:t>
+            </a:r>
+            <a:endParaRPr lang="de-CH" sz="3100" dirty="0"/>
+          </a:p>
+          <a:p>
+            <a:pPr lvl="1"/>
+            <a:r>
+              <a:rPr lang="de-CH" sz="2000" dirty="0" err="1"/>
+              <a:t>Textures</a:t>
+            </a:r>
+            <a:r>
+              <a:rPr lang="de-CH" sz="2000" dirty="0"/>
+              <a:t> und </a:t>
+            </a:r>
+            <a:r>
+              <a:rPr lang="de-CH" sz="2000" dirty="0" err="1"/>
+              <a:t>Vectoren</a:t>
+            </a:r>
+            <a:endParaRPr lang="de-CH" dirty="0"/>
+          </a:p>
+          <a:p>
+            <a:pPr lvl="1"/>
+            <a:r>
+              <a:rPr lang="de-CH" sz="2000" dirty="0"/>
+              <a:t>Sound Manager</a:t>
+            </a:r>
+            <a:endParaRPr lang="de-CH" dirty="0"/>
+          </a:p>
+          <a:p>
+            <a:r>
+              <a:rPr lang="de-CH" sz="2300" dirty="0"/>
+              <a:t>Architektur</a:t>
+            </a:r>
+            <a:endParaRPr lang="de-CH" sz="3100" dirty="0"/>
+          </a:p>
+          <a:p>
+            <a:pPr lvl="1"/>
+            <a:r>
+              <a:rPr lang="de-CH" sz="2000" dirty="0"/>
+              <a:t>MVC</a:t>
+            </a:r>
+            <a:endParaRPr lang="de-CH" dirty="0"/>
+          </a:p>
+          <a:p>
+            <a:pPr lvl="1"/>
+            <a:r>
+              <a:rPr lang="de-CH" sz="2000" dirty="0"/>
+              <a:t>Screen</a:t>
+            </a:r>
+            <a:endParaRPr lang="de-CH" dirty="0"/>
+          </a:p>
+          <a:p>
+            <a:pPr lvl="1"/>
+            <a:r>
+              <a:rPr lang="de-CH" sz="2000" dirty="0" err="1"/>
+              <a:t>Renderer</a:t>
+            </a:r>
+            <a:endParaRPr lang="de-CH" dirty="0"/>
+          </a:p>
+        </p:txBody>
+      </p:sp>
+    </p:spTree>
+    <p:extLst>
+      <p:ext uri="{BB962C8B-B14F-4D97-AF65-F5344CB8AC3E}">
+        <p14:creationId xmlns:p14="http://schemas.microsoft.com/office/powerpoint/2010/main" val="3480487774"/>
+      </p:ext>
+    </p:extLst>
+  </p:cSld>
+  <p:clrMapOvr>
+    <a:masterClrMapping/>
+  </p:clrMapOvr>
+</p:sld>
+</file>
+
 <file path=ppt/slides/slide9.xml><?xml version="1.0" encoding="utf-8"?>
 <p:sld xmlns:a="http://schemas.openxmlformats.org/drawingml/2006/main" xmlns:r="http://schemas.openxmlformats.org/officeDocument/2006/relationships" xmlns:p="http://schemas.openxmlformats.org/presentationml/2006/main">
   <p:cSld>
@@ -5985,12 +6308,12 @@
       </p:grpSpPr>
       <p:sp>
         <p:nvSpPr>
-          <p:cNvPr id="11" name="Titel 10"/>
-          <p:cNvSpPr>
-            <a:spLocks noGrp="1"/>
-          </p:cNvSpPr>
-          <p:nvPr>
-            <p:ph type="ctrTitle"/>
+          <p:cNvPr id="4" name="Titel 3"/>
+          <p:cNvSpPr>
+            <a:spLocks noGrp="1"/>
+          </p:cNvSpPr>
+          <p:nvPr>
+            <p:ph type="title"/>
           </p:nvPr>
         </p:nvSpPr>
         <p:spPr/>
@@ -6000,30 +6323,7 @@
           <a:p>
             <a:r>
               <a:rPr lang="de-CH" dirty="0" smtClean="0"/>
-              <a:t>Vielen Dank</a:t>
-            </a:r>
-            <a:endParaRPr lang="de-CH" dirty="0"/>
-          </a:p>
-        </p:txBody>
-      </p:sp>
-      <p:sp>
-        <p:nvSpPr>
-          <p:cNvPr id="12" name="Untertitel 11"/>
-          <p:cNvSpPr>
-            <a:spLocks noGrp="1"/>
-          </p:cNvSpPr>
-          <p:nvPr>
-            <p:ph type="subTitle" idx="1"/>
-          </p:nvPr>
-        </p:nvSpPr>
-        <p:spPr/>
-        <p:txBody>
-          <a:bodyPr/>
-          <a:lstStyle/>
-          <a:p>
-            <a:r>
-              <a:rPr lang="de-CH" dirty="0" smtClean="0"/>
-              <a:t>Für die Aufmerksamkeit</a:t>
+              <a:t>Demo Prototyp</a:t>
             </a:r>
             <a:endParaRPr lang="de-CH" dirty="0"/>
           </a:p>
@@ -6032,7 +6332,7 @@
     </p:spTree>
     <p:extLst>
       <p:ext uri="{BB962C8B-B14F-4D97-AF65-F5344CB8AC3E}">
-        <p14:creationId xmlns:p14="http://schemas.microsoft.com/office/powerpoint/2010/main" val="682285084"/>
+        <p14:creationId xmlns:p14="http://schemas.microsoft.com/office/powerpoint/2010/main" val="3567899889"/>
       </p:ext>
     </p:extLst>
   </p:cSld>

</xml_diff>